<commit_message>
refactor: Normal line added to the Histogram graph - PPTX and PDF file updated
</commit_message>
<xml_diff>
--- a/Danial/vis_and_analysis_final_A199.pptx
+++ b/Danial/vis_and_analysis_final_A199.pptx
@@ -417,7 +417,7 @@
             <a:fld id="{93FAAC3A-BD1F-4A00-9099-74B95789FE00}" type="datetimeFigureOut">
               <a:rPr lang="en-GB" smtClean="0"/>
               <a:pPr/>
-              <a:t>25/11/2025</a:t>
+              <a:t>26/11/2025</a:t>
             </a:fld>
             <a:endParaRPr lang="en-GB"/>
           </a:p>
@@ -596,7 +596,7 @@
             <a:fld id="{8E359C8A-39F6-4045-9163-4042C4C26B15}" type="datetimeFigureOut">
               <a:rPr lang="en-GB" smtClean="0"/>
               <a:pPr/>
-              <a:t>25/11/2025</a:t>
+              <a:t>26/11/2025</a:t>
             </a:fld>
             <a:endParaRPr lang="en-GB"/>
           </a:p>
@@ -5612,42 +5612,6 @@
           </a:p>
         </p:txBody>
       </p:sp>
-      <p:pic>
-        <p:nvPicPr>
-          <p:cNvPr id="11" name="Picture 10">
-            <a:extLst>
-              <a:ext uri="{FF2B5EF4-FFF2-40B4-BE49-F238E27FC236}">
-                <a16:creationId xmlns:a16="http://schemas.microsoft.com/office/drawing/2014/main" id="{3EB71E67-EBA6-8854-0835-29697F6810A6}"/>
-              </a:ext>
-            </a:extLst>
-          </p:cNvPr>
-          <p:cNvPicPr>
-            <a:picLocks noChangeAspect="1"/>
-          </p:cNvPicPr>
-          <p:nvPr/>
-        </p:nvPicPr>
-        <p:blipFill>
-          <a:blip r:embed="rId3">
-            <a:extLst>
-              <a:ext uri="{28A0092B-C50C-407E-A947-70E740481C1C}">
-                <a14:useLocalDpi xmlns:a14="http://schemas.microsoft.com/office/drawing/2010/main" val="0"/>
-              </a:ext>
-            </a:extLst>
-          </a:blip>
-          <a:stretch>
-            <a:fillRect/>
-          </a:stretch>
-        </p:blipFill>
-        <p:spPr>
-          <a:xfrm>
-            <a:off x="4539342" y="321580"/>
-            <a:ext cx="7499943" cy="6214840"/>
-          </a:xfrm>
-          <a:prstGeom prst="rect">
-            <a:avLst/>
-          </a:prstGeom>
-        </p:spPr>
-      </p:pic>
       <p:sp>
         <p:nvSpPr>
           <p:cNvPr id="3" name="Footer Placeholder 2">
@@ -5756,6 +5720,42 @@
           </a:p>
         </p:txBody>
       </p:sp>
+      <p:pic>
+        <p:nvPicPr>
+          <p:cNvPr id="5" name="Picture 4" descr="A graph of a number of times&#10;&#10;AI-generated content may be incorrect.">
+            <a:extLst>
+              <a:ext uri="{FF2B5EF4-FFF2-40B4-BE49-F238E27FC236}">
+                <a16:creationId xmlns:a16="http://schemas.microsoft.com/office/drawing/2014/main" id="{F44ACD52-8DA5-BD1D-5075-34921375C4AC}"/>
+              </a:ext>
+            </a:extLst>
+          </p:cNvPr>
+          <p:cNvPicPr>
+            <a:picLocks noChangeAspect="1"/>
+          </p:cNvPicPr>
+          <p:nvPr/>
+        </p:nvPicPr>
+        <p:blipFill>
+          <a:blip r:embed="rId3">
+            <a:extLst>
+              <a:ext uri="{28A0092B-C50C-407E-A947-70E740481C1C}">
+                <a14:useLocalDpi xmlns:a14="http://schemas.microsoft.com/office/drawing/2010/main" val="0"/>
+              </a:ext>
+            </a:extLst>
+          </a:blip>
+          <a:stretch>
+            <a:fillRect/>
+          </a:stretch>
+        </p:blipFill>
+        <p:spPr>
+          <a:xfrm>
+            <a:off x="5558589" y="242643"/>
+            <a:ext cx="6268553" cy="6372713"/>
+          </a:xfrm>
+          <a:prstGeom prst="rect">
+            <a:avLst/>
+          </a:prstGeom>
+        </p:spPr>
+      </p:pic>
     </p:spTree>
     <p:extLst>
       <p:ext uri="{BB962C8B-B14F-4D97-AF65-F5344CB8AC3E}">
@@ -9239,6 +9239,15 @@
 </file>
 
 <file path=customXml/item1.xml><?xml version="1.0" encoding="utf-8"?>
+<?mso-contentType ?>
+<FormTemplates xmlns="http://schemas.microsoft.com/sharepoint/v3/contenttype/forms">
+  <Display>DocumentLibraryForm</Display>
+  <Edit>DocumentLibraryForm</Edit>
+  <New>DocumentLibraryForm</New>
+</FormTemplates>
+</file>
+
+<file path=customXml/item2.xml><?xml version="1.0" encoding="utf-8"?>
 <ct:contentTypeSchema xmlns:ct="http://schemas.microsoft.com/office/2006/metadata/contentType" xmlns:ma="http://schemas.microsoft.com/office/2006/metadata/properties/metaAttributes" ct:_="" ma:_="" ma:contentTypeName="Document" ma:contentTypeID="0x01010026DBA85F447B164191BB36C258697B67" ma:contentTypeVersion="14" ma:contentTypeDescription="Create a new document." ma:contentTypeScope="" ma:versionID="ea511d05ca7f895fe9556935b5c9af34">
   <xsd:schema xmlns:xsd="http://www.w3.org/2001/XMLSchema" xmlns:xs="http://www.w3.org/2001/XMLSchema" xmlns:p="http://schemas.microsoft.com/office/2006/metadata/properties" xmlns:ns2="4ad138b4-2b68-4b70-945d-07f8f18b1c9a" xmlns:ns3="3c474641-ec36-472f-b125-6b1b0910eaa4" targetNamespace="http://schemas.microsoft.com/office/2006/metadata/properties" ma:root="true" ma:fieldsID="662270106d7a7e100bcac2c5f8d29899" ns2:_="" ns3:_="">
     <xsd:import namespace="4ad138b4-2b68-4b70-945d-07f8f18b1c9a"/>
@@ -9463,15 +9472,6 @@
 </ct:contentTypeSchema>
 </file>
 
-<file path=customXml/item2.xml><?xml version="1.0" encoding="utf-8"?>
-<?mso-contentType ?>
-<FormTemplates xmlns="http://schemas.microsoft.com/sharepoint/v3/contenttype/forms">
-  <Display>DocumentLibraryForm</Display>
-  <Edit>DocumentLibraryForm</Edit>
-  <New>DocumentLibraryForm</New>
-</FormTemplates>
-</file>
-
 <file path=customXml/item3.xml><?xml version="1.0" encoding="utf-8"?>
 <p:properties xmlns:p="http://schemas.microsoft.com/office/2006/metadata/properties" xmlns:xsi="http://www.w3.org/2001/XMLSchema-instance" xmlns:pc="http://schemas.microsoft.com/office/infopath/2007/PartnerControls">
   <documentManagement>
@@ -9481,6 +9481,14 @@
 </file>
 
 <file path=customXml/itemProps1.xml><?xml version="1.0" encoding="utf-8"?>
+<ds:datastoreItem xmlns:ds="http://schemas.openxmlformats.org/officeDocument/2006/customXml" ds:itemID="{91C521DD-2673-4EE6-BB9B-DC5C3320FFBB}">
+  <ds:schemaRefs>
+    <ds:schemaRef ds:uri="http://schemas.microsoft.com/sharepoint/v3/contenttype/forms"/>
+  </ds:schemaRefs>
+</ds:datastoreItem>
+</file>
+
+<file path=customXml/itemProps2.xml><?xml version="1.0" encoding="utf-8"?>
 <ds:datastoreItem xmlns:ds="http://schemas.openxmlformats.org/officeDocument/2006/customXml" ds:itemID="{421B8C57-903D-4D0E-8336-7B512F760CD1}">
   <ds:schemaRefs>
     <ds:schemaRef ds:uri="3c474641-ec36-472f-b125-6b1b0910eaa4"/>
@@ -9495,14 +9503,6 @@
     <ds:schemaRef ds:uri="http://schemas.microsoft.com/office/infopath/2007/PartnerControls"/>
     <ds:schemaRef ds:uri="http://schemas.openxmlformats.org/package/2006/metadata/core-properties"/>
     <ds:schemaRef ds:uri="http://www.w3.org/2001/XMLSchema"/>
-  </ds:schemaRefs>
-</ds:datastoreItem>
-</file>
-
-<file path=customXml/itemProps2.xml><?xml version="1.0" encoding="utf-8"?>
-<ds:datastoreItem xmlns:ds="http://schemas.openxmlformats.org/officeDocument/2006/customXml" ds:itemID="{91C521DD-2673-4EE6-BB9B-DC5C3320FFBB}">
-  <ds:schemaRefs>
-    <ds:schemaRef ds:uri="http://schemas.microsoft.com/sharepoint/v3/contenttype/forms"/>
   </ds:schemaRefs>
 </ds:datastoreItem>
 </file>

</xml_diff>